<commit_message>
Additional Figures for constructor part.
</commit_message>
<xml_diff>
--- a/Figures/VectorConstructors.pptx
+++ b/Figures/VectorConstructors.pptx
@@ -3118,12 +3118,9 @@
           <a:lstStyle/>
           <a:p>
             <a:r>
-              <a:rPr lang="en-GB" b="1" dirty="0" err="1" smtClean="0">
+              <a:rPr lang="en-GB" dirty="0" err="1" smtClean="0">
                 <a:solidFill>
-                  <a:schemeClr val="accent2">
-                    <a:lumMod val="60000"/>
-                    <a:lumOff val="40000"/>
-                  </a:schemeClr>
+                  <a:schemeClr val="accent2"/>
                 </a:solidFill>
                 <a:latin typeface="Lucida Console"/>
                 <a:cs typeface="Lucida Console"/>
@@ -3131,12 +3128,9 @@
               <a:t>VecCtors</a:t>
             </a:r>
             <a:r>
-              <a:rPr lang="en-GB" b="1" dirty="0" smtClean="0">
+              <a:rPr lang="en-GB" dirty="0" smtClean="0">
                 <a:solidFill>
-                  <a:schemeClr val="accent2">
-                    <a:lumMod val="60000"/>
-                    <a:lumOff val="40000"/>
-                  </a:schemeClr>
+                  <a:schemeClr val="accent2"/>
                 </a:solidFill>
                 <a:latin typeface="Lucida Console"/>
                 <a:cs typeface="Lucida Console"/>
@@ -3144,31 +3138,25 @@
               <a:t> </a:t>
             </a:r>
             <a:r>
-              <a:rPr lang="en-GB" b="1" dirty="0" smtClean="0">
+              <a:rPr lang="en-GB" dirty="0" smtClean="0">
                 <a:latin typeface="Lucida Console"/>
                 <a:cs typeface="Lucida Console"/>
               </a:rPr>
               <a:t>: </a:t>
             </a:r>
             <a:r>
-              <a:rPr lang="en-GB" b="1" dirty="0" err="1" smtClean="0">
+              <a:rPr lang="en-GB" dirty="0" err="1" smtClean="0">
                 <a:solidFill>
-                  <a:schemeClr val="accent2">
-                    <a:lumMod val="60000"/>
-                    <a:lumOff val="40000"/>
-                  </a:schemeClr>
+                  <a:srgbClr val="C0504D"/>
                 </a:solidFill>
                 <a:latin typeface="Lucida Console"/>
                 <a:cs typeface="Lucida Console"/>
               </a:rPr>
               <a:t>CEnum</a:t>
             </a:r>
-            <a:endParaRPr lang="en-GB" b="1" dirty="0" smtClean="0">
+            <a:endParaRPr lang="en-GB" dirty="0" smtClean="0">
               <a:solidFill>
-                <a:schemeClr val="accent2">
-                  <a:lumMod val="60000"/>
-                  <a:lumOff val="40000"/>
-                </a:schemeClr>
+                <a:srgbClr val="C0504D"/>
               </a:solidFill>
               <a:latin typeface="Lucida Console"/>
               <a:cs typeface="Lucida Console"/>
@@ -3176,9 +3164,9 @@
           </a:p>
           <a:p>
             <a:r>
-              <a:rPr lang="en-GB" b="1" dirty="0" err="1" smtClean="0">
+              <a:rPr lang="en-GB" dirty="0" err="1" smtClean="0">
                 <a:solidFill>
-                  <a:srgbClr val="D99694"/>
+                  <a:srgbClr val="C0504D"/>
                 </a:solidFill>
                 <a:latin typeface="Lucida Console"/>
                 <a:cs typeface="Lucida Console"/>
@@ -3186,9 +3174,9 @@
               <a:t>VecCtors</a:t>
             </a:r>
             <a:r>
-              <a:rPr lang="en-GB" b="1" dirty="0" smtClean="0">
+              <a:rPr lang="en-GB" dirty="0" smtClean="0">
                 <a:solidFill>
-                  <a:srgbClr val="D99694"/>
+                  <a:srgbClr val="C0504D"/>
                 </a:solidFill>
                 <a:latin typeface="Lucida Console"/>
                 <a:cs typeface="Lucida Console"/>
@@ -3196,14 +3184,14 @@
               <a:t> </a:t>
             </a:r>
             <a:r>
-              <a:rPr lang="en-GB" b="1" dirty="0" smtClean="0">
+              <a:rPr lang="en-GB" dirty="0" smtClean="0">
                 <a:latin typeface="Lucida Console"/>
                 <a:cs typeface="Lucida Console"/>
               </a:rPr>
               <a:t>= </a:t>
             </a:r>
             <a:r>
-              <a:rPr lang="en-GB" b="1" dirty="0" smtClean="0">
+              <a:rPr lang="en-GB" dirty="0" smtClean="0">
                 <a:solidFill>
                   <a:schemeClr val="accent3"/>
                 </a:solidFill>
@@ -3213,7 +3201,7 @@
               <a:t>[ </a:t>
             </a:r>
             <a:r>
-              <a:rPr lang="en-GB" b="1" dirty="0" smtClean="0">
+              <a:rPr lang="en-GB" dirty="0" smtClean="0">
                 <a:solidFill>
                   <a:schemeClr val="accent4">
                     <a:lumMod val="60000"/>
@@ -3226,7 +3214,7 @@
               <a:t>“Nil”</a:t>
             </a:r>
             <a:r>
-              <a:rPr lang="en-GB" b="1" dirty="0" smtClean="0">
+              <a:rPr lang="en-GB" dirty="0" smtClean="0">
                 <a:solidFill>
                   <a:schemeClr val="accent3"/>
                 </a:solidFill>
@@ -3236,7 +3224,7 @@
               <a:t> , </a:t>
             </a:r>
             <a:r>
-              <a:rPr lang="en-GB" b="1" dirty="0" smtClean="0">
+              <a:rPr lang="en-GB" dirty="0" smtClean="0">
                 <a:solidFill>
                   <a:srgbClr val="B3A2C7"/>
                 </a:solidFill>
@@ -3246,7 +3234,7 @@
               <a:t>“Cons”</a:t>
             </a:r>
             <a:r>
-              <a:rPr lang="en-GB" b="1" dirty="0" smtClean="0">
+              <a:rPr lang="en-GB" dirty="0" smtClean="0">
                 <a:solidFill>
                   <a:schemeClr val="accent3"/>
                 </a:solidFill>
@@ -3255,13 +3243,6 @@
               </a:rPr>
               <a:t> ]</a:t>
             </a:r>
-            <a:endParaRPr lang="en-GB" b="1" dirty="0" smtClean="0">
-              <a:solidFill>
-                <a:schemeClr val="accent3"/>
-              </a:solidFill>
-              <a:latin typeface="Lucida Console"/>
-              <a:cs typeface="Lucida Console"/>
-            </a:endParaRPr>
           </a:p>
         </p:txBody>
       </p:sp>

</xml_diff>